<commit_message>
Mejoras slides "Test Doubles"
</commit_message>
<xml_diff>
--- a/Diapositivas/2. Test Doubles.pptx
+++ b/Diapositivas/2. Test Doubles.pptx
@@ -35,15 +35,15 @@
     <p:sldId id="495" r:id="rId26"/>
     <p:sldId id="500" r:id="rId27"/>
     <p:sldId id="496" r:id="rId28"/>
-    <p:sldId id="685" r:id="rId29"/>
-    <p:sldId id="683" r:id="rId30"/>
+    <p:sldId id="683" r:id="rId29"/>
+    <p:sldId id="685" r:id="rId30"/>
     <p:sldId id="655" r:id="rId31"/>
     <p:sldId id="656" r:id="rId32"/>
     <p:sldId id="657" r:id="rId33"/>
     <p:sldId id="628" r:id="rId34"/>
     <p:sldId id="624" r:id="rId35"/>
     <p:sldId id="625" r:id="rId36"/>
-    <p:sldId id="626" r:id="rId37"/>
+    <p:sldId id="686" r:id="rId37"/>
     <p:sldId id="627" r:id="rId38"/>
     <p:sldId id="586" r:id="rId39"/>
   </p:sldIdLst>
@@ -254,7 +254,7 @@
           <a:p>
             <a:fld id="{63D5FC4C-9EE1-4746-A368-724F618FC790}" type="datetimeFigureOut">
               <a:rPr lang="es-PE" smtClean="0"/>
-              <a:t>12/04/2013</a:t>
+              <a:t>24/04/2013</a:t>
             </a:fld>
             <a:endParaRPr lang="es-PE"/>
           </a:p>
@@ -2916,7 +2916,11 @@
           <a:bodyPr/>
           <a:lstStyle/>
           <a:p>
-            <a:endParaRPr lang="es-PE" dirty="0"/>
+            <a:pPr marL="0" indent="0">
+              <a:buFontTx/>
+              <a:buNone/>
+            </a:pPr>
+            <a:endParaRPr lang="es-PE" noProof="0" dirty="0"/>
           </a:p>
         </p:txBody>
       </p:sp>
@@ -3000,11 +3004,7 @@
           <a:bodyPr/>
           <a:lstStyle/>
           <a:p>
-            <a:pPr marL="0" indent="0">
-              <a:buFontTx/>
-              <a:buNone/>
-            </a:pPr>
-            <a:endParaRPr lang="es-PE" noProof="0" dirty="0"/>
+            <a:endParaRPr lang="es-PE" dirty="0"/>
           </a:p>
         </p:txBody>
       </p:sp>
@@ -7459,7 +7459,7 @@
             <a:fld id="{807CB568-C05F-482F-9F26-AA302B8892DF}" type="datetimeFigureOut">
               <a:rPr lang="es-ES" smtClean="0"/>
               <a:pPr/>
-              <a:t>12/04/2013</a:t>
+              <a:t>24/04/2013</a:t>
             </a:fld>
             <a:endParaRPr lang="es-ES"/>
           </a:p>
@@ -7638,7 +7638,7 @@
             <a:fld id="{807CB568-C05F-482F-9F26-AA302B8892DF}" type="datetimeFigureOut">
               <a:rPr lang="es-ES" smtClean="0"/>
               <a:pPr/>
-              <a:t>12/04/2013</a:t>
+              <a:t>24/04/2013</a:t>
             </a:fld>
             <a:endParaRPr lang="es-ES"/>
           </a:p>
@@ -7827,7 +7827,7 @@
             <a:fld id="{807CB568-C05F-482F-9F26-AA302B8892DF}" type="datetimeFigureOut">
               <a:rPr lang="es-ES" smtClean="0"/>
               <a:pPr/>
-              <a:t>12/04/2013</a:t>
+              <a:t>24/04/2013</a:t>
             </a:fld>
             <a:endParaRPr lang="es-ES"/>
           </a:p>
@@ -8006,7 +8006,7 @@
             <a:fld id="{807CB568-C05F-482F-9F26-AA302B8892DF}" type="datetimeFigureOut">
               <a:rPr lang="es-ES" smtClean="0"/>
               <a:pPr/>
-              <a:t>12/04/2013</a:t>
+              <a:t>24/04/2013</a:t>
             </a:fld>
             <a:endParaRPr lang="es-ES"/>
           </a:p>
@@ -8261,7 +8261,7 @@
             <a:fld id="{807CB568-C05F-482F-9F26-AA302B8892DF}" type="datetimeFigureOut">
               <a:rPr lang="es-ES" smtClean="0"/>
               <a:pPr/>
-              <a:t>12/04/2013</a:t>
+              <a:t>24/04/2013</a:t>
             </a:fld>
             <a:endParaRPr lang="es-ES"/>
           </a:p>
@@ -8558,7 +8558,7 @@
             <a:fld id="{807CB568-C05F-482F-9F26-AA302B8892DF}" type="datetimeFigureOut">
               <a:rPr lang="es-ES" smtClean="0"/>
               <a:pPr/>
-              <a:t>12/04/2013</a:t>
+              <a:t>24/04/2013</a:t>
             </a:fld>
             <a:endParaRPr lang="es-ES"/>
           </a:p>
@@ -8989,7 +8989,7 @@
             <a:fld id="{807CB568-C05F-482F-9F26-AA302B8892DF}" type="datetimeFigureOut">
               <a:rPr lang="es-ES" smtClean="0"/>
               <a:pPr/>
-              <a:t>12/04/2013</a:t>
+              <a:t>24/04/2013</a:t>
             </a:fld>
             <a:endParaRPr lang="es-ES"/>
           </a:p>
@@ -9116,7 +9116,7 @@
             <a:fld id="{807CB568-C05F-482F-9F26-AA302B8892DF}" type="datetimeFigureOut">
               <a:rPr lang="es-ES" smtClean="0"/>
               <a:pPr/>
-              <a:t>12/04/2013</a:t>
+              <a:t>24/04/2013</a:t>
             </a:fld>
             <a:endParaRPr lang="es-ES"/>
           </a:p>
@@ -9220,7 +9220,7 @@
             <a:fld id="{807CB568-C05F-482F-9F26-AA302B8892DF}" type="datetimeFigureOut">
               <a:rPr lang="es-ES" smtClean="0"/>
               <a:pPr/>
-              <a:t>12/04/2013</a:t>
+              <a:t>24/04/2013</a:t>
             </a:fld>
             <a:endParaRPr lang="es-ES"/>
           </a:p>
@@ -9506,7 +9506,7 @@
             <a:fld id="{807CB568-C05F-482F-9F26-AA302B8892DF}" type="datetimeFigureOut">
               <a:rPr lang="es-ES" smtClean="0"/>
               <a:pPr/>
-              <a:t>12/04/2013</a:t>
+              <a:t>24/04/2013</a:t>
             </a:fld>
             <a:endParaRPr lang="es-ES"/>
           </a:p>
@@ -9775,7 +9775,7 @@
             <a:fld id="{807CB568-C05F-482F-9F26-AA302B8892DF}" type="datetimeFigureOut">
               <a:rPr lang="es-ES" smtClean="0"/>
               <a:pPr/>
-              <a:t>12/04/2013</a:t>
+              <a:t>24/04/2013</a:t>
             </a:fld>
             <a:endParaRPr lang="es-ES"/>
           </a:p>
@@ -10026,7 +10026,7 @@
             <a:fld id="{807CB568-C05F-482F-9F26-AA302B8892DF}" type="datetimeFigureOut">
               <a:rPr lang="es-ES" smtClean="0"/>
               <a:pPr/>
-              <a:t>12/04/2013</a:t>
+              <a:t>24/04/2013</a:t>
             </a:fld>
             <a:endParaRPr lang="es-ES"/>
           </a:p>
@@ -18731,6 +18731,320 @@
           <a:chExt cx="0" cy="0"/>
         </a:xfrm>
       </p:grpSpPr>
+      <p:sp>
+        <p:nvSpPr>
+          <p:cNvPr id="5" name="2 Título"/>
+          <p:cNvSpPr>
+            <a:spLocks noGrp="1"/>
+          </p:cNvSpPr>
+          <p:nvPr>
+            <p:ph type="title"/>
+          </p:nvPr>
+        </p:nvSpPr>
+        <p:spPr>
+          <a:xfrm>
+            <a:off x="457200" y="1412776"/>
+            <a:ext cx="8229600" cy="2016224"/>
+          </a:xfrm>
+        </p:spPr>
+        <p:txBody>
+          <a:bodyPr/>
+          <a:lstStyle/>
+          <a:p>
+            <a:r>
+              <a:rPr lang="es-PE" dirty="0" smtClean="0">
+                <a:solidFill>
+                  <a:srgbClr val="FFC000"/>
+                </a:solidFill>
+              </a:rPr>
+              <a:t>Ejercicio</a:t>
+            </a:r>
+            <a:br>
+              <a:rPr lang="es-PE" dirty="0" smtClean="0">
+                <a:solidFill>
+                  <a:srgbClr val="FFC000"/>
+                </a:solidFill>
+              </a:rPr>
+            </a:br>
+            <a:r>
+              <a:rPr lang="es-PE" dirty="0" smtClean="0">
+                <a:solidFill>
+                  <a:srgbClr val="00B050"/>
+                </a:solidFill>
+              </a:rPr>
+              <a:t>Realizar pruebas unitarias a clases con dependencias</a:t>
+            </a:r>
+            <a:endParaRPr lang="es-PE" dirty="0">
+              <a:solidFill>
+                <a:srgbClr val="00B050"/>
+              </a:solidFill>
+            </a:endParaRPr>
+          </a:p>
+        </p:txBody>
+      </p:sp>
+      <p:sp>
+        <p:nvSpPr>
+          <p:cNvPr id="4" name="5 Marcador de contenido"/>
+          <p:cNvSpPr txBox="1">
+            <a:spLocks/>
+          </p:cNvSpPr>
+          <p:nvPr/>
+        </p:nvSpPr>
+        <p:spPr bwMode="auto">
+          <a:xfrm>
+            <a:off x="467544" y="3615546"/>
+            <a:ext cx="8208912" cy="1253614"/>
+          </a:xfrm>
+          <a:prstGeom prst="rect">
+            <a:avLst/>
+          </a:prstGeom>
+          <a:noFill/>
+          <a:ln w="9525">
+            <a:noFill/>
+            <a:miter lim="800000"/>
+            <a:headEnd/>
+            <a:tailEnd/>
+          </a:ln>
+        </p:spPr>
+        <p:txBody>
+          <a:bodyPr vert="horz" wrap="square" lIns="91440" tIns="45720" rIns="91440" bIns="45720" numCol="1" anchor="t" anchorCtr="0" compatLnSpc="1">
+            <a:prstTxWarp prst="textNoShape">
+              <a:avLst/>
+            </a:prstTxWarp>
+          </a:bodyPr>
+          <a:lstStyle>
+            <a:lvl1pPr marL="342900" indent="-342900" algn="l" rtl="0" eaLnBrk="1" fontAlgn="base" hangingPunct="1">
+              <a:spcBef>
+                <a:spcPct val="20000"/>
+              </a:spcBef>
+              <a:spcAft>
+                <a:spcPct val="0"/>
+              </a:spcAft>
+              <a:buFont typeface="Arial" charset="0"/>
+              <a:buChar char="•"/>
+              <a:defRPr sz="3200" kern="1200">
+                <a:solidFill>
+                  <a:schemeClr val="tx1"/>
+                </a:solidFill>
+                <a:latin typeface="+mn-lt"/>
+                <a:ea typeface="+mn-ea"/>
+                <a:cs typeface="+mn-cs"/>
+              </a:defRPr>
+            </a:lvl1pPr>
+            <a:lvl2pPr marL="742950" indent="-285750" algn="l" rtl="0" eaLnBrk="1" fontAlgn="base" hangingPunct="1">
+              <a:spcBef>
+                <a:spcPct val="20000"/>
+              </a:spcBef>
+              <a:spcAft>
+                <a:spcPct val="0"/>
+              </a:spcAft>
+              <a:buFont typeface="Arial" charset="0"/>
+              <a:buChar char="–"/>
+              <a:defRPr sz="2800" kern="1200">
+                <a:solidFill>
+                  <a:schemeClr val="tx1"/>
+                </a:solidFill>
+                <a:latin typeface="+mn-lt"/>
+                <a:ea typeface="+mn-ea"/>
+                <a:cs typeface="+mn-cs"/>
+              </a:defRPr>
+            </a:lvl2pPr>
+            <a:lvl3pPr marL="1143000" indent="-228600" algn="l" rtl="0" eaLnBrk="1" fontAlgn="base" hangingPunct="1">
+              <a:spcBef>
+                <a:spcPct val="20000"/>
+              </a:spcBef>
+              <a:spcAft>
+                <a:spcPct val="0"/>
+              </a:spcAft>
+              <a:buFont typeface="Arial" charset="0"/>
+              <a:buChar char="•"/>
+              <a:defRPr sz="2400" kern="1200">
+                <a:solidFill>
+                  <a:schemeClr val="tx1"/>
+                </a:solidFill>
+                <a:latin typeface="+mn-lt"/>
+                <a:ea typeface="+mn-ea"/>
+                <a:cs typeface="+mn-cs"/>
+              </a:defRPr>
+            </a:lvl3pPr>
+            <a:lvl4pPr marL="1600200" indent="-228600" algn="l" rtl="0" eaLnBrk="1" fontAlgn="base" hangingPunct="1">
+              <a:spcBef>
+                <a:spcPct val="20000"/>
+              </a:spcBef>
+              <a:spcAft>
+                <a:spcPct val="0"/>
+              </a:spcAft>
+              <a:buFont typeface="Arial" charset="0"/>
+              <a:buChar char="–"/>
+              <a:defRPr sz="2000" kern="1200">
+                <a:solidFill>
+                  <a:schemeClr val="tx1"/>
+                </a:solidFill>
+                <a:latin typeface="+mn-lt"/>
+                <a:ea typeface="+mn-ea"/>
+                <a:cs typeface="+mn-cs"/>
+              </a:defRPr>
+            </a:lvl4pPr>
+            <a:lvl5pPr marL="2057400" indent="-228600" algn="l" rtl="0" eaLnBrk="1" fontAlgn="base" hangingPunct="1">
+              <a:spcBef>
+                <a:spcPct val="20000"/>
+              </a:spcBef>
+              <a:spcAft>
+                <a:spcPct val="0"/>
+              </a:spcAft>
+              <a:buFont typeface="Arial" charset="0"/>
+              <a:buChar char="»"/>
+              <a:defRPr sz="2000" kern="1200">
+                <a:solidFill>
+                  <a:schemeClr val="tx1"/>
+                </a:solidFill>
+                <a:latin typeface="+mn-lt"/>
+                <a:ea typeface="+mn-ea"/>
+                <a:cs typeface="+mn-cs"/>
+              </a:defRPr>
+            </a:lvl5pPr>
+            <a:lvl6pPr marL="2514600" indent="-228600" algn="l" defTabSz="914400" rtl="0" eaLnBrk="1" latinLnBrk="0" hangingPunct="1">
+              <a:spcBef>
+                <a:spcPct val="20000"/>
+              </a:spcBef>
+              <a:buFont typeface="Arial" pitchFamily="34" charset="0"/>
+              <a:buChar char="•"/>
+              <a:defRPr sz="2000" kern="1200">
+                <a:solidFill>
+                  <a:schemeClr val="tx1"/>
+                </a:solidFill>
+                <a:latin typeface="+mn-lt"/>
+                <a:ea typeface="+mn-ea"/>
+                <a:cs typeface="+mn-cs"/>
+              </a:defRPr>
+            </a:lvl6pPr>
+            <a:lvl7pPr marL="2971800" indent="-228600" algn="l" defTabSz="914400" rtl="0" eaLnBrk="1" latinLnBrk="0" hangingPunct="1">
+              <a:spcBef>
+                <a:spcPct val="20000"/>
+              </a:spcBef>
+              <a:buFont typeface="Arial" pitchFamily="34" charset="0"/>
+              <a:buChar char="•"/>
+              <a:defRPr sz="2000" kern="1200">
+                <a:solidFill>
+                  <a:schemeClr val="tx1"/>
+                </a:solidFill>
+                <a:latin typeface="+mn-lt"/>
+                <a:ea typeface="+mn-ea"/>
+                <a:cs typeface="+mn-cs"/>
+              </a:defRPr>
+            </a:lvl7pPr>
+            <a:lvl8pPr marL="3429000" indent="-228600" algn="l" defTabSz="914400" rtl="0" eaLnBrk="1" latinLnBrk="0" hangingPunct="1">
+              <a:spcBef>
+                <a:spcPct val="20000"/>
+              </a:spcBef>
+              <a:buFont typeface="Arial" pitchFamily="34" charset="0"/>
+              <a:buChar char="•"/>
+              <a:defRPr sz="2000" kern="1200">
+                <a:solidFill>
+                  <a:schemeClr val="tx1"/>
+                </a:solidFill>
+                <a:latin typeface="+mn-lt"/>
+                <a:ea typeface="+mn-ea"/>
+                <a:cs typeface="+mn-cs"/>
+              </a:defRPr>
+            </a:lvl8pPr>
+            <a:lvl9pPr marL="3886200" indent="-228600" algn="l" defTabSz="914400" rtl="0" eaLnBrk="1" latinLnBrk="0" hangingPunct="1">
+              <a:spcBef>
+                <a:spcPct val="20000"/>
+              </a:spcBef>
+              <a:buFont typeface="Arial" pitchFamily="34" charset="0"/>
+              <a:buChar char="•"/>
+              <a:defRPr sz="2000" kern="1200">
+                <a:solidFill>
+                  <a:schemeClr val="tx1"/>
+                </a:solidFill>
+                <a:latin typeface="+mn-lt"/>
+                <a:ea typeface="+mn-ea"/>
+                <a:cs typeface="+mn-cs"/>
+              </a:defRPr>
+            </a:lvl9pPr>
+          </a:lstStyle>
+          <a:p>
+            <a:r>
+              <a:rPr lang="es-PE" sz="2800" dirty="0" smtClean="0"/>
+              <a:t>Utilizar </a:t>
+            </a:r>
+            <a:r>
+              <a:rPr lang="es-PE" sz="2800" dirty="0" err="1" smtClean="0"/>
+              <a:t>stubs</a:t>
+            </a:r>
+            <a:r>
+              <a:rPr lang="es-PE" sz="2800" dirty="0" smtClean="0"/>
+              <a:t> y </a:t>
+            </a:r>
+            <a:r>
+              <a:rPr lang="es-PE" sz="2800" dirty="0" err="1" smtClean="0"/>
+              <a:t>mocks</a:t>
+            </a:r>
+            <a:r>
+              <a:rPr lang="es-PE" sz="2800" dirty="0" smtClean="0"/>
+              <a:t> para realizar pruebas unitarias a la clase "</a:t>
+            </a:r>
+            <a:r>
+              <a:rPr lang="es-PE" sz="2800" dirty="0" err="1" smtClean="0"/>
+              <a:t>CostoEnvioService</a:t>
+            </a:r>
+            <a:r>
+              <a:rPr lang="es-PE" sz="2800" dirty="0" smtClean="0"/>
+              <a:t>" y </a:t>
+            </a:r>
+            <a:r>
+              <a:rPr lang="es-PE" sz="2800" dirty="0" smtClean="0"/>
+              <a:t>"</a:t>
+            </a:r>
+            <a:r>
+              <a:rPr lang="es-PE" sz="2800" dirty="0" err="1" smtClean="0"/>
+              <a:t>AlmacenService</a:t>
+            </a:r>
+            <a:r>
+              <a:rPr lang="es-PE" sz="2800" dirty="0" smtClean="0"/>
+              <a:t>"</a:t>
+            </a:r>
+          </a:p>
+        </p:txBody>
+      </p:sp>
+    </p:spTree>
+    <p:extLst>
+      <p:ext uri="{BB962C8B-B14F-4D97-AF65-F5344CB8AC3E}">
+        <p14:creationId xmlns:p14="http://schemas.microsoft.com/office/powerpoint/2010/main" val="3006028064"/>
+      </p:ext>
+    </p:extLst>
+  </p:cSld>
+  <p:clrMapOvr>
+    <a:masterClrMapping/>
+  </p:clrMapOvr>
+  <p:timing>
+    <p:tnLst>
+      <p:par>
+        <p:cTn id="1" dur="indefinite" restart="never" nodeType="tmRoot"/>
+      </p:par>
+    </p:tnLst>
+  </p:timing>
+</p:sld>
+</file>
+
+<file path=ppt/slides/slide29.xml><?xml version="1.0" encoding="utf-8"?>
+<p:sld xmlns:a="http://schemas.openxmlformats.org/drawingml/2006/main" xmlns:r="http://schemas.openxmlformats.org/officeDocument/2006/relationships" xmlns:p="http://schemas.openxmlformats.org/presentationml/2006/main">
+  <p:cSld>
+    <p:spTree>
+      <p:nvGrpSpPr>
+        <p:cNvPr id="1" name=""/>
+        <p:cNvGrpSpPr/>
+        <p:nvPr/>
+      </p:nvGrpSpPr>
+      <p:grpSpPr>
+        <a:xfrm>
+          <a:off x="0" y="0"/>
+          <a:ext cx="0" cy="0"/>
+          <a:chOff x="0" y="0"/>
+          <a:chExt cx="0" cy="0"/>
+        </a:xfrm>
+      </p:grpSpPr>
       <p:pic>
         <p:nvPicPr>
           <p:cNvPr id="2051" name="Picture 3" descr="C:\Users\Snahider\Desktop\FullStack.png"/>
@@ -19165,316 +19479,6 @@
       <p:bldP spid="12" grpId="0"/>
       <p:bldP spid="6" grpId="0" animBg="1"/>
     </p:bldLst>
-  </p:timing>
-</p:sld>
-</file>
-
-<file path=ppt/slides/slide29.xml><?xml version="1.0" encoding="utf-8"?>
-<p:sld xmlns:a="http://schemas.openxmlformats.org/drawingml/2006/main" xmlns:r="http://schemas.openxmlformats.org/officeDocument/2006/relationships" xmlns:p="http://schemas.openxmlformats.org/presentationml/2006/main">
-  <p:cSld>
-    <p:spTree>
-      <p:nvGrpSpPr>
-        <p:cNvPr id="1" name=""/>
-        <p:cNvGrpSpPr/>
-        <p:nvPr/>
-      </p:nvGrpSpPr>
-      <p:grpSpPr>
-        <a:xfrm>
-          <a:off x="0" y="0"/>
-          <a:ext cx="0" cy="0"/>
-          <a:chOff x="0" y="0"/>
-          <a:chExt cx="0" cy="0"/>
-        </a:xfrm>
-      </p:grpSpPr>
-      <p:sp>
-        <p:nvSpPr>
-          <p:cNvPr id="5" name="2 Título"/>
-          <p:cNvSpPr>
-            <a:spLocks noGrp="1"/>
-          </p:cNvSpPr>
-          <p:nvPr>
-            <p:ph type="title"/>
-          </p:nvPr>
-        </p:nvSpPr>
-        <p:spPr>
-          <a:xfrm>
-            <a:off x="457200" y="1412776"/>
-            <a:ext cx="8229600" cy="2016224"/>
-          </a:xfrm>
-        </p:spPr>
-        <p:txBody>
-          <a:bodyPr/>
-          <a:lstStyle/>
-          <a:p>
-            <a:r>
-              <a:rPr lang="es-PE" dirty="0" smtClean="0">
-                <a:solidFill>
-                  <a:srgbClr val="FFC000"/>
-                </a:solidFill>
-              </a:rPr>
-              <a:t>Ejercicio</a:t>
-            </a:r>
-            <a:br>
-              <a:rPr lang="es-PE" dirty="0" smtClean="0">
-                <a:solidFill>
-                  <a:srgbClr val="FFC000"/>
-                </a:solidFill>
-              </a:rPr>
-            </a:br>
-            <a:r>
-              <a:rPr lang="es-PE" dirty="0" smtClean="0">
-                <a:solidFill>
-                  <a:srgbClr val="00B050"/>
-                </a:solidFill>
-              </a:rPr>
-              <a:t>Realizar pruebas unitarias a clases con dependencias</a:t>
-            </a:r>
-            <a:endParaRPr lang="es-PE" dirty="0">
-              <a:solidFill>
-                <a:srgbClr val="00B050"/>
-              </a:solidFill>
-            </a:endParaRPr>
-          </a:p>
-        </p:txBody>
-      </p:sp>
-      <p:sp>
-        <p:nvSpPr>
-          <p:cNvPr id="4" name="5 Marcador de contenido"/>
-          <p:cNvSpPr txBox="1">
-            <a:spLocks/>
-          </p:cNvSpPr>
-          <p:nvPr/>
-        </p:nvSpPr>
-        <p:spPr bwMode="auto">
-          <a:xfrm>
-            <a:off x="467544" y="3615546"/>
-            <a:ext cx="8208912" cy="1253614"/>
-          </a:xfrm>
-          <a:prstGeom prst="rect">
-            <a:avLst/>
-          </a:prstGeom>
-          <a:noFill/>
-          <a:ln w="9525">
-            <a:noFill/>
-            <a:miter lim="800000"/>
-            <a:headEnd/>
-            <a:tailEnd/>
-          </a:ln>
-        </p:spPr>
-        <p:txBody>
-          <a:bodyPr vert="horz" wrap="square" lIns="91440" tIns="45720" rIns="91440" bIns="45720" numCol="1" anchor="t" anchorCtr="0" compatLnSpc="1">
-            <a:prstTxWarp prst="textNoShape">
-              <a:avLst/>
-            </a:prstTxWarp>
-          </a:bodyPr>
-          <a:lstStyle>
-            <a:lvl1pPr marL="342900" indent="-342900" algn="l" rtl="0" eaLnBrk="1" fontAlgn="base" hangingPunct="1">
-              <a:spcBef>
-                <a:spcPct val="20000"/>
-              </a:spcBef>
-              <a:spcAft>
-                <a:spcPct val="0"/>
-              </a:spcAft>
-              <a:buFont typeface="Arial" charset="0"/>
-              <a:buChar char="•"/>
-              <a:defRPr sz="3200" kern="1200">
-                <a:solidFill>
-                  <a:schemeClr val="tx1"/>
-                </a:solidFill>
-                <a:latin typeface="+mn-lt"/>
-                <a:ea typeface="+mn-ea"/>
-                <a:cs typeface="+mn-cs"/>
-              </a:defRPr>
-            </a:lvl1pPr>
-            <a:lvl2pPr marL="742950" indent="-285750" algn="l" rtl="0" eaLnBrk="1" fontAlgn="base" hangingPunct="1">
-              <a:spcBef>
-                <a:spcPct val="20000"/>
-              </a:spcBef>
-              <a:spcAft>
-                <a:spcPct val="0"/>
-              </a:spcAft>
-              <a:buFont typeface="Arial" charset="0"/>
-              <a:buChar char="–"/>
-              <a:defRPr sz="2800" kern="1200">
-                <a:solidFill>
-                  <a:schemeClr val="tx1"/>
-                </a:solidFill>
-                <a:latin typeface="+mn-lt"/>
-                <a:ea typeface="+mn-ea"/>
-                <a:cs typeface="+mn-cs"/>
-              </a:defRPr>
-            </a:lvl2pPr>
-            <a:lvl3pPr marL="1143000" indent="-228600" algn="l" rtl="0" eaLnBrk="1" fontAlgn="base" hangingPunct="1">
-              <a:spcBef>
-                <a:spcPct val="20000"/>
-              </a:spcBef>
-              <a:spcAft>
-                <a:spcPct val="0"/>
-              </a:spcAft>
-              <a:buFont typeface="Arial" charset="0"/>
-              <a:buChar char="•"/>
-              <a:defRPr sz="2400" kern="1200">
-                <a:solidFill>
-                  <a:schemeClr val="tx1"/>
-                </a:solidFill>
-                <a:latin typeface="+mn-lt"/>
-                <a:ea typeface="+mn-ea"/>
-                <a:cs typeface="+mn-cs"/>
-              </a:defRPr>
-            </a:lvl3pPr>
-            <a:lvl4pPr marL="1600200" indent="-228600" algn="l" rtl="0" eaLnBrk="1" fontAlgn="base" hangingPunct="1">
-              <a:spcBef>
-                <a:spcPct val="20000"/>
-              </a:spcBef>
-              <a:spcAft>
-                <a:spcPct val="0"/>
-              </a:spcAft>
-              <a:buFont typeface="Arial" charset="0"/>
-              <a:buChar char="–"/>
-              <a:defRPr sz="2000" kern="1200">
-                <a:solidFill>
-                  <a:schemeClr val="tx1"/>
-                </a:solidFill>
-                <a:latin typeface="+mn-lt"/>
-                <a:ea typeface="+mn-ea"/>
-                <a:cs typeface="+mn-cs"/>
-              </a:defRPr>
-            </a:lvl4pPr>
-            <a:lvl5pPr marL="2057400" indent="-228600" algn="l" rtl="0" eaLnBrk="1" fontAlgn="base" hangingPunct="1">
-              <a:spcBef>
-                <a:spcPct val="20000"/>
-              </a:spcBef>
-              <a:spcAft>
-                <a:spcPct val="0"/>
-              </a:spcAft>
-              <a:buFont typeface="Arial" charset="0"/>
-              <a:buChar char="»"/>
-              <a:defRPr sz="2000" kern="1200">
-                <a:solidFill>
-                  <a:schemeClr val="tx1"/>
-                </a:solidFill>
-                <a:latin typeface="+mn-lt"/>
-                <a:ea typeface="+mn-ea"/>
-                <a:cs typeface="+mn-cs"/>
-              </a:defRPr>
-            </a:lvl5pPr>
-            <a:lvl6pPr marL="2514600" indent="-228600" algn="l" defTabSz="914400" rtl="0" eaLnBrk="1" latinLnBrk="0" hangingPunct="1">
-              <a:spcBef>
-                <a:spcPct val="20000"/>
-              </a:spcBef>
-              <a:buFont typeface="Arial" pitchFamily="34" charset="0"/>
-              <a:buChar char="•"/>
-              <a:defRPr sz="2000" kern="1200">
-                <a:solidFill>
-                  <a:schemeClr val="tx1"/>
-                </a:solidFill>
-                <a:latin typeface="+mn-lt"/>
-                <a:ea typeface="+mn-ea"/>
-                <a:cs typeface="+mn-cs"/>
-              </a:defRPr>
-            </a:lvl6pPr>
-            <a:lvl7pPr marL="2971800" indent="-228600" algn="l" defTabSz="914400" rtl="0" eaLnBrk="1" latinLnBrk="0" hangingPunct="1">
-              <a:spcBef>
-                <a:spcPct val="20000"/>
-              </a:spcBef>
-              <a:buFont typeface="Arial" pitchFamily="34" charset="0"/>
-              <a:buChar char="•"/>
-              <a:defRPr sz="2000" kern="1200">
-                <a:solidFill>
-                  <a:schemeClr val="tx1"/>
-                </a:solidFill>
-                <a:latin typeface="+mn-lt"/>
-                <a:ea typeface="+mn-ea"/>
-                <a:cs typeface="+mn-cs"/>
-              </a:defRPr>
-            </a:lvl7pPr>
-            <a:lvl8pPr marL="3429000" indent="-228600" algn="l" defTabSz="914400" rtl="0" eaLnBrk="1" latinLnBrk="0" hangingPunct="1">
-              <a:spcBef>
-                <a:spcPct val="20000"/>
-              </a:spcBef>
-              <a:buFont typeface="Arial" pitchFamily="34" charset="0"/>
-              <a:buChar char="•"/>
-              <a:defRPr sz="2000" kern="1200">
-                <a:solidFill>
-                  <a:schemeClr val="tx1"/>
-                </a:solidFill>
-                <a:latin typeface="+mn-lt"/>
-                <a:ea typeface="+mn-ea"/>
-                <a:cs typeface="+mn-cs"/>
-              </a:defRPr>
-            </a:lvl8pPr>
-            <a:lvl9pPr marL="3886200" indent="-228600" algn="l" defTabSz="914400" rtl="0" eaLnBrk="1" latinLnBrk="0" hangingPunct="1">
-              <a:spcBef>
-                <a:spcPct val="20000"/>
-              </a:spcBef>
-              <a:buFont typeface="Arial" pitchFamily="34" charset="0"/>
-              <a:buChar char="•"/>
-              <a:defRPr sz="2000" kern="1200">
-                <a:solidFill>
-                  <a:schemeClr val="tx1"/>
-                </a:solidFill>
-                <a:latin typeface="+mn-lt"/>
-                <a:ea typeface="+mn-ea"/>
-                <a:cs typeface="+mn-cs"/>
-              </a:defRPr>
-            </a:lvl9pPr>
-          </a:lstStyle>
-          <a:p>
-            <a:r>
-              <a:rPr lang="es-PE" sz="2800" dirty="0" smtClean="0"/>
-              <a:t>Utilizar </a:t>
-            </a:r>
-            <a:r>
-              <a:rPr lang="es-PE" sz="2800" dirty="0" err="1" smtClean="0"/>
-              <a:t>stubs</a:t>
-            </a:r>
-            <a:r>
-              <a:rPr lang="es-PE" sz="2800" dirty="0" smtClean="0"/>
-              <a:t> y </a:t>
-            </a:r>
-            <a:r>
-              <a:rPr lang="es-PE" sz="2800" dirty="0" err="1" smtClean="0"/>
-              <a:t>mocks</a:t>
-            </a:r>
-            <a:r>
-              <a:rPr lang="es-PE" sz="2800" dirty="0" smtClean="0"/>
-              <a:t> para realizar pruebas unitarias a la clase "</a:t>
-            </a:r>
-            <a:r>
-              <a:rPr lang="es-PE" sz="2800" dirty="0" err="1" smtClean="0"/>
-              <a:t>CostoEnvioService</a:t>
-            </a:r>
-            <a:r>
-              <a:rPr lang="es-PE" sz="2800" dirty="0" smtClean="0"/>
-              <a:t>" y "</a:t>
-            </a:r>
-            <a:r>
-              <a:rPr lang="es-PE" sz="2800" dirty="0" err="1" smtClean="0"/>
-              <a:t>OrdenService</a:t>
-            </a:r>
-            <a:r>
-              <a:rPr lang="es-PE" sz="2800" dirty="0" smtClean="0"/>
-              <a:t>"</a:t>
-            </a:r>
-          </a:p>
-        </p:txBody>
-      </p:sp>
-    </p:spTree>
-    <p:extLst>
-      <p:ext uri="{BB962C8B-B14F-4D97-AF65-F5344CB8AC3E}">
-        <p14:creationId xmlns:p14="http://schemas.microsoft.com/office/powerpoint/2010/main" val="3006028064"/>
-      </p:ext>
-    </p:extLst>
-  </p:cSld>
-  <p:clrMapOvr>
-    <a:masterClrMapping/>
-  </p:clrMapOvr>
-  <p:timing>
-    <p:tnLst>
-      <p:par>
-        <p:cTn id="1" dur="indefinite" restart="never" nodeType="tmRoot"/>
-      </p:par>
-    </p:tnLst>
   </p:timing>
 </p:sld>
 </file>
@@ -23099,7 +23103,7 @@
         </p:nvSpPr>
         <p:spPr>
           <a:xfrm>
-            <a:off x="457200" y="548680"/>
+            <a:off x="457200" y="629816"/>
             <a:ext cx="8229600" cy="1143000"/>
           </a:xfrm>
         </p:spPr>
@@ -23195,8 +23199,8 @@
         </p:nvSpPr>
         <p:spPr bwMode="auto">
           <a:xfrm>
-            <a:off x="395536" y="2195736"/>
-            <a:ext cx="8424936" cy="4329608"/>
+            <a:off x="395536" y="2555776"/>
+            <a:ext cx="8424936" cy="3825552"/>
           </a:xfrm>
           <a:prstGeom prst="rect">
             <a:avLst/>
@@ -23368,7 +23372,7 @@
             </a:lvl9pPr>
           </a:lstStyle>
           <a:p>
-            <a:pPr marL="0" indent="0">
+            <a:pPr marL="0" indent="0" algn="ctr">
               <a:buNone/>
             </a:pPr>
             <a:r>
@@ -23393,23 +23397,15 @@
             </a:r>
           </a:p>
           <a:p>
-            <a:pPr marL="0" indent="0">
+            <a:pPr marL="0" indent="0" algn="ctr">
               <a:buNone/>
             </a:pPr>
-            <a:endParaRPr lang="es-PE" sz="2800" dirty="0" smtClean="0"/>
+            <a:endParaRPr lang="es-PE" sz="1100" dirty="0" smtClean="0"/>
           </a:p>
           <a:p>
             <a:r>
               <a:rPr lang="es-PE" sz="2800" dirty="0" smtClean="0"/>
-              <a:t>Cada uno debe pensar en alguna pregunta o algún argumento en contra que le podrían hacer . </a:t>
-            </a:r>
-            <a:r>
-              <a:rPr lang="es-PE" sz="2800" dirty="0" err="1" smtClean="0"/>
-              <a:t>Ejm</a:t>
-            </a:r>
-            <a:r>
-              <a:rPr lang="es-PE" sz="2800" dirty="0" smtClean="0"/>
-              <a:t>:</a:t>
+              <a:t>Pensar en preguntas o argumento en contra que le podrían hacer .</a:t>
             </a:r>
           </a:p>
           <a:p>
@@ -23417,12 +23413,6 @@
             <a:r>
               <a:rPr lang="es-PE" sz="2400" dirty="0" smtClean="0"/>
               <a:t>¿ Las personas de QA ya no son necesarias ?</a:t>
-            </a:r>
-          </a:p>
-          <a:p>
-            <a:r>
-              <a:rPr lang="es-PE" sz="2800" dirty="0" smtClean="0"/>
-              <a:t>Compartirlo y discutirlo con el resto del grupo.</a:t>
             </a:r>
           </a:p>
         </p:txBody>
@@ -23430,13 +23420,21 @@
     </p:spTree>
     <p:extLst>
       <p:ext uri="{BB962C8B-B14F-4D97-AF65-F5344CB8AC3E}">
-        <p14:creationId xmlns:p14="http://schemas.microsoft.com/office/powerpoint/2010/main" val="2577520838"/>
+        <p14:creationId xmlns:p14="http://schemas.microsoft.com/office/powerpoint/2010/main" val="3128660656"/>
       </p:ext>
     </p:extLst>
   </p:cSld>
   <p:clrMapOvr>
     <a:masterClrMapping/>
   </p:clrMapOvr>
+  <mc:AlternateContent xmlns:mc="http://schemas.openxmlformats.org/markup-compatibility/2006" xmlns:p14="http://schemas.microsoft.com/office/powerpoint/2010/main">
+    <mc:Choice Requires="p14">
+      <p:transition spd="slow" p14:dur="2000"/>
+    </mc:Choice>
+    <mc:Fallback xmlns="">
+      <p:transition spd="slow"/>
+    </mc:Fallback>
+  </mc:AlternateContent>
   <p:timing>
     <p:tnLst>
       <p:par>

</xml_diff>